<commit_message>
Add few more slides to Tracking PPT
</commit_message>
<xml_diff>
--- a/Presentations/IntroductoryTalk_CU.pptx
+++ b/Presentations/IntroductoryTalk_CU.pptx
@@ -5533,7 +5533,13 @@
               <a:rPr b="0" lang="en-IN" sz="4400" spc="-1" strike="noStrike">
                 <a:latin typeface="Arial"/>
               </a:rPr>
-              <a:t>Click to edit the title text format</a:t>
+              <a:t>Click to edit the title text </a:t>
+            </a:r>
+            <a:r>
+              <a:rPr b="0" lang="en-IN" sz="4400" spc="-1" strike="noStrike">
+                <a:latin typeface="Arial"/>
+              </a:rPr>
+              <a:t>format</a:t>
             </a:r>
             <a:endParaRPr b="0" lang="en-IN" sz="4400" spc="-1" strike="noStrike">
               <a:latin typeface="Arial"/>
@@ -6039,7 +6045,13 @@
               <a:rPr b="0" lang="en-IN" sz="4400" spc="-1" strike="noStrike">
                 <a:latin typeface="Arial"/>
               </a:rPr>
-              <a:t>Click to edit the title text format</a:t>
+              <a:t>Click to edit the </a:t>
+            </a:r>
+            <a:r>
+              <a:rPr b="0" lang="en-IN" sz="4400" spc="-1" strike="noStrike">
+                <a:latin typeface="Arial"/>
+              </a:rPr>
+              <a:t>title text format</a:t>
             </a:r>
             <a:endParaRPr b="0" lang="en-IN" sz="4400" spc="-1" strike="noStrike">
               <a:latin typeface="Arial"/>

</xml_diff>